<commit_message>
Added matrix part of presentation
</commit_message>
<xml_diff>
--- a/Presentation/PPP, Week 1, Meeting 1.pptx
+++ b/Presentation/PPP, Week 1, Meeting 1.pptx
@@ -13,7 +13,7 @@
     <p:sldId id="258" r:id="rId4"/>
     <p:sldId id="259" r:id="rId5"/>
     <p:sldId id="260" r:id="rId6"/>
-    <p:sldId id="261" r:id="rId7"/>
+    <p:sldId id="266" r:id="rId7"/>
     <p:sldId id="262" r:id="rId8"/>
     <p:sldId id="265" r:id="rId9"/>
   </p:sldIdLst>
@@ -4514,7 +4514,7 @@
           <p:cNvPr id="2" name="Titel 1">
             <a:extLst>
               <a:ext uri="{FF2B5EF4-FFF2-40B4-BE49-F238E27FC236}">
-                <a16:creationId xmlns:a16="http://schemas.microsoft.com/office/drawing/2014/main" id="{DE05F754-9A62-D642-90EF-10BA07FF1D85}"/>
+                <a16:creationId xmlns:a16="http://schemas.microsoft.com/office/drawing/2014/main" id="{3EBE704B-7B26-2E4A-9399-90AE6809CB18}"/>
               </a:ext>
             </a:extLst>
           </p:cNvPr>
@@ -4537,10 +4537,233 @@
           </a:p>
         </p:txBody>
       </p:sp>
+      <p:sp>
+        <p:nvSpPr>
+          <p:cNvPr id="8" name="Tijdelijke aanduiding voor inhoud 7">
+            <a:extLst>
+              <a:ext uri="{FF2B5EF4-FFF2-40B4-BE49-F238E27FC236}">
+                <a16:creationId xmlns:a16="http://schemas.microsoft.com/office/drawing/2014/main" id="{7DFFDD57-6A6F-424E-B6B9-6C1F455F166C}"/>
+              </a:ext>
+            </a:extLst>
+          </p:cNvPr>
+          <p:cNvSpPr>
+            <a:spLocks noGrp="1"/>
+          </p:cNvSpPr>
+          <p:nvPr>
+            <p:ph sz="half" idx="1"/>
+          </p:nvPr>
+        </p:nvSpPr>
+        <p:spPr/>
+        <p:txBody>
+          <a:bodyPr/>
+          <a:lstStyle/>
+          <a:p>
+            <a:r>
+              <a:rPr lang="nl-NL" dirty="0"/>
+              <a:t>H is blue, P is </a:t>
+            </a:r>
+            <a:r>
+              <a:rPr lang="nl-NL" dirty="0" err="1"/>
+              <a:t>yellow</a:t>
+            </a:r>
+            <a:endParaRPr lang="nl-NL" dirty="0"/>
+          </a:p>
+          <a:p>
+            <a:r>
+              <a:rPr lang="nl-NL" dirty="0" err="1"/>
+              <a:t>Elements</a:t>
+            </a:r>
+            <a:r>
+              <a:rPr lang="nl-NL" dirty="0"/>
+              <a:t> get </a:t>
+            </a:r>
+            <a:r>
+              <a:rPr lang="nl-NL" dirty="0" err="1"/>
+              <a:t>numerical</a:t>
+            </a:r>
+            <a:r>
+              <a:rPr lang="nl-NL" dirty="0"/>
+              <a:t> </a:t>
+            </a:r>
+            <a:r>
+              <a:rPr lang="nl-NL" dirty="0" err="1"/>
+              <a:t>value</a:t>
+            </a:r>
+            <a:endParaRPr lang="nl-NL" dirty="0"/>
+          </a:p>
+          <a:p>
+            <a:r>
+              <a:rPr lang="nl-NL" dirty="0" err="1"/>
+              <a:t>Spawn</a:t>
+            </a:r>
+            <a:r>
+              <a:rPr lang="nl-NL" dirty="0"/>
+              <a:t> first element </a:t>
+            </a:r>
+            <a:r>
+              <a:rPr lang="nl-NL" dirty="0" err="1"/>
+              <a:t>somewhere</a:t>
+            </a:r>
+            <a:r>
+              <a:rPr lang="nl-NL" dirty="0"/>
+              <a:t> in </a:t>
+            </a:r>
+            <a:r>
+              <a:rPr lang="nl-NL" dirty="0" err="1"/>
+              <a:t>the</a:t>
+            </a:r>
+            <a:r>
+              <a:rPr lang="nl-NL" dirty="0"/>
+              <a:t> </a:t>
+            </a:r>
+            <a:r>
+              <a:rPr lang="nl-NL" dirty="0" err="1"/>
+              <a:t>middle</a:t>
+            </a:r>
+            <a:endParaRPr lang="nl-NL" dirty="0"/>
+          </a:p>
+          <a:p>
+            <a:r>
+              <a:rPr lang="nl-NL" dirty="0"/>
+              <a:t>Chain </a:t>
+            </a:r>
+            <a:r>
+              <a:rPr lang="nl-NL" dirty="0" err="1"/>
+              <a:t>other</a:t>
+            </a:r>
+            <a:r>
+              <a:rPr lang="nl-NL" dirty="0"/>
+              <a:t> </a:t>
+            </a:r>
+            <a:r>
+              <a:rPr lang="nl-NL" dirty="0" err="1"/>
+              <a:t>elements</a:t>
+            </a:r>
+            <a:r>
+              <a:rPr lang="nl-NL" dirty="0"/>
+              <a:t> </a:t>
+            </a:r>
+            <a:r>
+              <a:rPr lang="nl-NL" dirty="0" err="1"/>
+              <a:t>randomly</a:t>
+            </a:r>
+            <a:r>
+              <a:rPr lang="nl-NL" dirty="0"/>
+              <a:t> </a:t>
+            </a:r>
+            <a:r>
+              <a:rPr lang="nl-NL" dirty="0" err="1"/>
+              <a:t>and</a:t>
+            </a:r>
+            <a:r>
+              <a:rPr lang="nl-NL" dirty="0"/>
+              <a:t> </a:t>
+            </a:r>
+            <a:r>
+              <a:rPr lang="nl-NL" dirty="0" err="1"/>
+              <a:t>self-avoidingly</a:t>
+            </a:r>
+            <a:endParaRPr lang="nl-NL" dirty="0"/>
+          </a:p>
+          <a:p>
+            <a:r>
+              <a:rPr lang="nl-NL" dirty="0"/>
+              <a:t>Save moves made </a:t>
+            </a:r>
+            <a:r>
+              <a:rPr lang="nl-NL" dirty="0" err="1"/>
+              <a:t>and</a:t>
+            </a:r>
+            <a:r>
+              <a:rPr lang="nl-NL" dirty="0"/>
+              <a:t> </a:t>
+            </a:r>
+            <a:r>
+              <a:rPr lang="nl-NL" dirty="0" err="1"/>
+              <a:t>occupied</a:t>
+            </a:r>
+            <a:r>
+              <a:rPr lang="nl-NL" dirty="0"/>
+              <a:t> ‘</a:t>
+            </a:r>
+            <a:r>
+              <a:rPr lang="nl-NL" dirty="0" err="1"/>
+              <a:t>tiles</a:t>
+            </a:r>
+            <a:r>
+              <a:rPr lang="nl-NL"/>
+              <a:t>’ in list</a:t>
+            </a:r>
+          </a:p>
+          <a:p>
+            <a:pPr marL="0" indent="0">
+              <a:buNone/>
+            </a:pPr>
+            <a:endParaRPr lang="nl-NL" dirty="0"/>
+          </a:p>
+          <a:p>
+            <a:endParaRPr lang="en-GB" dirty="0"/>
+          </a:p>
+        </p:txBody>
+      </p:sp>
+      <p:sp>
+        <p:nvSpPr>
+          <p:cNvPr id="9" name="Tijdelijke aanduiding voor inhoud 8">
+            <a:extLst>
+              <a:ext uri="{FF2B5EF4-FFF2-40B4-BE49-F238E27FC236}">
+                <a16:creationId xmlns:a16="http://schemas.microsoft.com/office/drawing/2014/main" id="{DAB95ADC-A642-4B09-A7BC-7C8D4413C6B9}"/>
+              </a:ext>
+            </a:extLst>
+          </p:cNvPr>
+          <p:cNvSpPr>
+            <a:spLocks noGrp="1"/>
+          </p:cNvSpPr>
+          <p:nvPr>
+            <p:ph sz="half" idx="2"/>
+          </p:nvPr>
+        </p:nvSpPr>
+        <p:spPr/>
+        <p:txBody>
+          <a:bodyPr/>
+          <a:lstStyle/>
+          <a:p>
+            <a:endParaRPr lang="en-GB"/>
+          </a:p>
+        </p:txBody>
+      </p:sp>
+      <p:pic>
+        <p:nvPicPr>
+          <p:cNvPr id="7" name="Afbeelding 6">
+            <a:extLst>
+              <a:ext uri="{FF2B5EF4-FFF2-40B4-BE49-F238E27FC236}">
+                <a16:creationId xmlns:a16="http://schemas.microsoft.com/office/drawing/2014/main" id="{0D1DD091-D221-4930-95A2-2CC6E2C27C28}"/>
+              </a:ext>
+            </a:extLst>
+          </p:cNvPr>
+          <p:cNvPicPr>
+            <a:picLocks noChangeAspect="1"/>
+          </p:cNvPicPr>
+          <p:nvPr/>
+        </p:nvPicPr>
+        <p:blipFill>
+          <a:blip r:embed="rId2"/>
+          <a:srcRect/>
+          <a:stretch/>
+        </p:blipFill>
+        <p:spPr>
+          <a:xfrm>
+            <a:off x="5920509" y="1660391"/>
+            <a:ext cx="5325485" cy="4681805"/>
+          </a:xfrm>
+          <a:prstGeom prst="rect">
+            <a:avLst/>
+          </a:prstGeom>
+        </p:spPr>
+      </p:pic>
     </p:spTree>
     <p:extLst>
       <p:ext uri="{BB962C8B-B14F-4D97-AF65-F5344CB8AC3E}">
-        <p14:creationId xmlns:p14="http://schemas.microsoft.com/office/powerpoint/2010/main" val="1778959606"/>
+        <p14:creationId xmlns:p14="http://schemas.microsoft.com/office/powerpoint/2010/main" val="2634493535"/>
       </p:ext>
     </p:extLst>
   </p:cSld>

</xml_diff>